<commit_message>
adding few samples csv and ppt of A det
</commit_message>
<xml_diff>
--- a/code/results/A det speard.pptx
+++ b/code/results/A det speard.pptx
@@ -7,12 +7,13 @@
   <p:sldIdLst>
     <p:sldId id="256" r:id="rId2"/>
     <p:sldId id="257" r:id="rId3"/>
-    <p:sldId id="259" r:id="rId4"/>
-    <p:sldId id="260" r:id="rId5"/>
-    <p:sldId id="261" r:id="rId6"/>
-    <p:sldId id="262" r:id="rId7"/>
-    <p:sldId id="258" r:id="rId8"/>
-    <p:sldId id="263" r:id="rId9"/>
+    <p:sldId id="264" r:id="rId4"/>
+    <p:sldId id="259" r:id="rId5"/>
+    <p:sldId id="260" r:id="rId6"/>
+    <p:sldId id="261" r:id="rId7"/>
+    <p:sldId id="262" r:id="rId8"/>
+    <p:sldId id="258" r:id="rId9"/>
+    <p:sldId id="263" r:id="rId10"/>
   </p:sldIdLst>
   <p:sldSz cx="12192000" cy="6858000"/>
   <p:notesSz cx="6858000" cy="9144000"/>
@@ -111,6 +112,11 @@
       </a:defRPr>
     </a:lvl9pPr>
   </p:defaultTextStyle>
+  <p:extLst>
+    <p:ext uri="{EFAFB233-063F-42B5-8137-9DF3F51BA10A}">
+      <p15:sldGuideLst xmlns:p15="http://schemas.microsoft.com/office/powerpoint/2012/main"/>
+    </p:ext>
+  </p:extLst>
 </p:presentation>
 </file>
 
@@ -3206,9 +3212,12 @@
             </a:r>
             <a:r>
               <a:rPr lang="en-US" dirty="0" smtClean="0"/>
-              <a:t>, but we cannot tell which is the best modulo by those graphs</a:t>
-            </a:r>
-            <a:endParaRPr lang="en-US" dirty="0"/>
+              <a:t>, but we cannot tell which is the best modulo by those </a:t>
+            </a:r>
+            <a:r>
+              <a:rPr lang="en-US" dirty="0" smtClean="0"/>
+              <a:t>graphs</a:t>
+            </a:r>
           </a:p>
         </p:txBody>
       </p:sp>
@@ -3249,49 +3258,124 @@
             <a:spLocks noGrp="1"/>
           </p:cNvSpPr>
           <p:nvPr>
-            <p:ph type="ctrTitle"/>
-          </p:nvPr>
-        </p:nvSpPr>
-        <p:spPr/>
-        <p:txBody>
-          <a:bodyPr/>
-          <a:lstStyle/>
-          <a:p>
+            <p:ph type="title"/>
+          </p:nvPr>
+        </p:nvSpPr>
+        <p:spPr/>
+        <p:txBody>
+          <a:bodyPr/>
+          <a:lstStyle/>
+          <a:p>
+            <a:r>
+              <a:rPr lang="en-US" dirty="0" smtClean="0"/>
+              <a:t>why we get this bell graph also when we have big errors</a:t>
+            </a:r>
+            <a:endParaRPr lang="en-US" dirty="0"/>
+          </a:p>
+        </p:txBody>
+      </p:sp>
+      <p:sp>
+        <p:nvSpPr>
+          <p:cNvPr id="3" name="Content Placeholder 2"/>
+          <p:cNvSpPr>
+            <a:spLocks noGrp="1"/>
+          </p:cNvSpPr>
+          <p:nvPr>
+            <p:ph idx="1"/>
+          </p:nvPr>
+        </p:nvSpPr>
+        <p:spPr/>
+        <p:txBody>
+          <a:bodyPr/>
+          <a:lstStyle/>
+          <a:p>
+            <a:r>
+              <a:rPr lang="en-US" dirty="0" smtClean="0"/>
+              <a:t>we get picks at 0, 1.6, 3.2 and 5</a:t>
+            </a:r>
+          </a:p>
+          <a:p>
+            <a:r>
+              <a:rPr lang="en-US" dirty="0" smtClean="0"/>
+              <a:t>we get 3.2 from </a:t>
+            </a:r>
             <a:r>
               <a:rPr lang="en-US" dirty="0" err="1" smtClean="0"/>
-              <a:t>x,y</a:t>
+              <a:t>Ys</a:t>
             </a:r>
             <a:r>
               <a:rPr lang="en-US" dirty="0" smtClean="0"/>
-              <a:t> before and after A multiplication</a:t>
-            </a:r>
+              <a:t> that are up to 1.6 and from </a:t>
+            </a:r>
+            <a:r>
+              <a:rPr lang="en-US" dirty="0" err="1" smtClean="0"/>
+              <a:t>Ys</a:t>
+            </a:r>
+            <a:r>
+              <a:rPr lang="en-US" dirty="0" smtClean="0"/>
+              <a:t> that are above</a:t>
+            </a:r>
+          </a:p>
+          <a:p>
+            <a:r>
+              <a:rPr lang="en-US" dirty="0" smtClean="0"/>
+              <a:t>so each pick can be received from 2 modulo areas</a:t>
+            </a:r>
+          </a:p>
+          <a:p>
+            <a:r>
+              <a:rPr lang="en-US" dirty="0" smtClean="0"/>
+              <a:t>because we have more </a:t>
+            </a:r>
+            <a:r>
+              <a:rPr lang="en-US" dirty="0" err="1" smtClean="0"/>
+              <a:t>Ys</a:t>
+            </a:r>
+            <a:r>
+              <a:rPr lang="en-US" dirty="0" smtClean="0"/>
+              <a:t> at the lower modulo area, we get this bell and not like uniform block</a:t>
+            </a:r>
+          </a:p>
+          <a:p>
             <a:endParaRPr lang="en-US" dirty="0"/>
           </a:p>
-        </p:txBody>
-      </p:sp>
-      <p:sp>
-        <p:nvSpPr>
-          <p:cNvPr id="3" name="Subtitle 2"/>
-          <p:cNvSpPr>
-            <a:spLocks noGrp="1"/>
-          </p:cNvSpPr>
-          <p:nvPr>
-            <p:ph type="subTitle" idx="1"/>
-          </p:nvPr>
-        </p:nvSpPr>
-        <p:spPr/>
-        <p:txBody>
-          <a:bodyPr/>
-          <a:lstStyle/>
-          <a:p>
+          <a:p>
+            <a:r>
+              <a:rPr lang="en-US" dirty="0" smtClean="0"/>
+              <a:t>we can try to simulate quantizer that is far from the modulo edge – to have a big tails, but I think we will get the same results</a:t>
+            </a:r>
             <a:endParaRPr lang="en-US" dirty="0"/>
           </a:p>
         </p:txBody>
       </p:sp>
+      <p:pic>
+        <p:nvPicPr>
+          <p:cNvPr id="4" name="Picture 3"/>
+          <p:cNvPicPr>
+            <a:picLocks noChangeAspect="1"/>
+          </p:cNvPicPr>
+          <p:nvPr/>
+        </p:nvPicPr>
+        <p:blipFill>
+          <a:blip r:embed="rId2"/>
+          <a:stretch>
+            <a:fillRect/>
+          </a:stretch>
+        </p:blipFill>
+        <p:spPr>
+          <a:xfrm>
+            <a:off x="7013638" y="894017"/>
+            <a:ext cx="2352675" cy="1428750"/>
+          </a:xfrm>
+          <a:prstGeom prst="rect">
+            <a:avLst/>
+          </a:prstGeom>
+        </p:spPr>
+      </p:pic>
     </p:spTree>
     <p:extLst>
       <p:ext uri="{BB962C8B-B14F-4D97-AF65-F5344CB8AC3E}">
-        <p14:creationId xmlns:p14="http://schemas.microsoft.com/office/powerpoint/2010/main" val="4013610012"/>
+        <p14:creationId xmlns:p14="http://schemas.microsoft.com/office/powerpoint/2010/main" val="885325717"/>
       </p:ext>
     </p:extLst>
   </p:cSld>
@@ -3325,17 +3409,21 @@
             <a:spLocks noGrp="1"/>
           </p:cNvSpPr>
           <p:nvPr>
-            <p:ph type="title"/>
-          </p:nvPr>
-        </p:nvSpPr>
-        <p:spPr/>
-        <p:txBody>
-          <a:bodyPr/>
-          <a:lstStyle/>
-          <a:p>
+            <p:ph type="ctrTitle"/>
+          </p:nvPr>
+        </p:nvSpPr>
+        <p:spPr/>
+        <p:txBody>
+          <a:bodyPr/>
+          <a:lstStyle/>
+          <a:p>
+            <a:r>
+              <a:rPr lang="en-US" dirty="0" err="1" smtClean="0"/>
+              <a:t>x,y</a:t>
+            </a:r>
             <a:r>
               <a:rPr lang="en-US" dirty="0" smtClean="0"/>
-              <a:t>eigenvalues of A</a:t>
+              <a:t> before and after A multiplication</a:t>
             </a:r>
             <a:endParaRPr lang="en-US" dirty="0"/>
           </a:p>
@@ -3343,53 +3431,19 @@
       </p:sp>
       <p:sp>
         <p:nvSpPr>
-          <p:cNvPr id="3" name="Content Placeholder 2"/>
-          <p:cNvSpPr>
-            <a:spLocks noGrp="1"/>
-          </p:cNvSpPr>
-          <p:nvPr>
-            <p:ph idx="1"/>
-          </p:nvPr>
-        </p:nvSpPr>
-        <p:spPr/>
-        <p:txBody>
-          <a:bodyPr/>
-          <a:lstStyle/>
-          <a:p>
-            <a:r>
-              <a:rPr lang="en-US" dirty="0" smtClean="0"/>
-              <a:t>if we do SVD on A matrix we decompose A to rotation and scaling </a:t>
-            </a:r>
-          </a:p>
-          <a:p>
-            <a:r>
-              <a:rPr lang="en-US" dirty="0" smtClean="0"/>
-              <a:t>the scaling is by the eigenvectors</a:t>
-            </a:r>
-          </a:p>
-          <a:p>
-            <a:r>
-              <a:rPr lang="en-US" dirty="0" smtClean="0"/>
-              <a:t>integer matrix can have only integer value at the determinant </a:t>
-            </a:r>
-          </a:p>
-          <a:p>
-            <a:r>
-              <a:rPr lang="en-US" dirty="0" smtClean="0"/>
-              <a:t>(we don’t want 0 determinant because we cannot invert the output)</a:t>
-            </a:r>
-          </a:p>
-          <a:p>
-            <a:r>
-              <a:rPr lang="en-US" dirty="0" smtClean="0"/>
-              <a:t>so we actually will get the same or more variance after multiplication at A</a:t>
-            </a:r>
-          </a:p>
-          <a:p>
-            <a:r>
-              <a:rPr lang="en-US" dirty="0" smtClean="0"/>
-              <a:t>so modulo size will have to be bigger (or the same) as the initial X,Y module and we save nothing…</a:t>
-            </a:r>
+          <p:cNvPr id="3" name="Subtitle 2"/>
+          <p:cNvSpPr>
+            <a:spLocks noGrp="1"/>
+          </p:cNvSpPr>
+          <p:nvPr>
+            <p:ph type="subTitle" idx="1"/>
+          </p:nvPr>
+        </p:nvSpPr>
+        <p:spPr/>
+        <p:txBody>
+          <a:bodyPr/>
+          <a:lstStyle/>
+          <a:p>
             <a:endParaRPr lang="en-US" dirty="0"/>
           </a:p>
         </p:txBody>
@@ -3397,7 +3451,7 @@
     </p:spTree>
     <p:extLst>
       <p:ext uri="{BB962C8B-B14F-4D97-AF65-F5344CB8AC3E}">
-        <p14:creationId xmlns:p14="http://schemas.microsoft.com/office/powerpoint/2010/main" val="2940343453"/>
+        <p14:creationId xmlns:p14="http://schemas.microsoft.com/office/powerpoint/2010/main" val="4013610012"/>
       </p:ext>
     </p:extLst>
   </p:cSld>
@@ -3441,63 +3495,60 @@
           <a:p>
             <a:r>
               <a:rPr lang="en-US" dirty="0" smtClean="0"/>
-              <a:t>target – get smaller variance of X after A</a:t>
+              <a:t>eigenvalues of A</a:t>
             </a:r>
             <a:endParaRPr lang="en-US" dirty="0"/>
           </a:p>
         </p:txBody>
       </p:sp>
-      <p:pic>
-        <p:nvPicPr>
-          <p:cNvPr id="4" name="Content Placeholder 3"/>
-          <p:cNvPicPr>
-            <a:picLocks noGrp="1" noChangeAspect="1"/>
-          </p:cNvPicPr>
+      <p:sp>
+        <p:nvSpPr>
+          <p:cNvPr id="3" name="Content Placeholder 2"/>
+          <p:cNvSpPr>
+            <a:spLocks noGrp="1"/>
+          </p:cNvSpPr>
           <p:nvPr>
             <p:ph idx="1"/>
           </p:nvPr>
-        </p:nvPicPr>
-        <p:blipFill>
-          <a:blip r:embed="rId2"/>
-          <a:stretch>
-            <a:fillRect/>
-          </a:stretch>
-        </p:blipFill>
-        <p:spPr>
-          <a:xfrm>
-            <a:off x="1840962" y="1825625"/>
-            <a:ext cx="8510075" cy="4351338"/>
-          </a:xfrm>
-          <a:prstGeom prst="rect">
-            <a:avLst/>
-          </a:prstGeom>
-        </p:spPr>
-      </p:pic>
-      <p:sp>
-        <p:nvSpPr>
-          <p:cNvPr id="5" name="TextBox 4"/>
-          <p:cNvSpPr txBox="1"/>
-          <p:nvPr/>
-        </p:nvSpPr>
-        <p:spPr>
-          <a:xfrm>
-            <a:off x="246888" y="2176272"/>
-            <a:ext cx="1472184" cy="2308324"/>
-          </a:xfrm>
-          <a:prstGeom prst="rect">
-            <a:avLst/>
-          </a:prstGeom>
-          <a:noFill/>
-        </p:spPr>
-        <p:txBody>
-          <a:bodyPr wrap="square" rtlCol="0">
-            <a:spAutoFit/>
-          </a:bodyPr>
+        </p:nvSpPr>
+        <p:spPr/>
+        <p:txBody>
+          <a:bodyPr/>
           <a:lstStyle/>
           <a:p>
             <a:r>
               <a:rPr lang="en-US" dirty="0" smtClean="0"/>
-              <a:t>but we actually have to put here the modulo size to be – let say to 3 delta instead of 1</a:t>
+              <a:t>if we do SVD on A matrix we decompose A to rotation and scaling </a:t>
+            </a:r>
+          </a:p>
+          <a:p>
+            <a:r>
+              <a:rPr lang="en-US" dirty="0" smtClean="0"/>
+              <a:t>the scaling is by the eigenvectors</a:t>
+            </a:r>
+          </a:p>
+          <a:p>
+            <a:r>
+              <a:rPr lang="en-US" dirty="0" smtClean="0"/>
+              <a:t>integer matrix can have only integer value at the determinant </a:t>
+            </a:r>
+          </a:p>
+          <a:p>
+            <a:r>
+              <a:rPr lang="en-US" dirty="0" smtClean="0"/>
+              <a:t>(we don’t want 0 determinant because we cannot invert the output)</a:t>
+            </a:r>
+          </a:p>
+          <a:p>
+            <a:r>
+              <a:rPr lang="en-US" dirty="0" smtClean="0"/>
+              <a:t>so we actually will get the same or more variance after multiplication at A</a:t>
+            </a:r>
+          </a:p>
+          <a:p>
+            <a:r>
+              <a:rPr lang="en-US" dirty="0" smtClean="0"/>
+              <a:t>so modulo size will have to be bigger (or the same) as the initial X,Y module and we save nothing…</a:t>
             </a:r>
             <a:endParaRPr lang="en-US" dirty="0"/>
           </a:p>
@@ -3506,7 +3557,7 @@
     </p:spTree>
     <p:extLst>
       <p:ext uri="{BB962C8B-B14F-4D97-AF65-F5344CB8AC3E}">
-        <p14:creationId xmlns:p14="http://schemas.microsoft.com/office/powerpoint/2010/main" val="3570919289"/>
+        <p14:creationId xmlns:p14="http://schemas.microsoft.com/office/powerpoint/2010/main" val="2940343453"/>
       </p:ext>
     </p:extLst>
   </p:cSld>
@@ -3550,6 +3601,115 @@
           <a:p>
             <a:r>
               <a:rPr lang="en-US" dirty="0" smtClean="0"/>
+              <a:t>target – get smaller variance of X after A</a:t>
+            </a:r>
+            <a:endParaRPr lang="en-US" dirty="0"/>
+          </a:p>
+        </p:txBody>
+      </p:sp>
+      <p:pic>
+        <p:nvPicPr>
+          <p:cNvPr id="4" name="Content Placeholder 3"/>
+          <p:cNvPicPr>
+            <a:picLocks noGrp="1" noChangeAspect="1"/>
+          </p:cNvPicPr>
+          <p:nvPr>
+            <p:ph idx="1"/>
+          </p:nvPr>
+        </p:nvPicPr>
+        <p:blipFill>
+          <a:blip r:embed="rId2"/>
+          <a:stretch>
+            <a:fillRect/>
+          </a:stretch>
+        </p:blipFill>
+        <p:spPr>
+          <a:xfrm>
+            <a:off x="1840962" y="1825625"/>
+            <a:ext cx="8510075" cy="4351338"/>
+          </a:xfrm>
+          <a:prstGeom prst="rect">
+            <a:avLst/>
+          </a:prstGeom>
+        </p:spPr>
+      </p:pic>
+      <p:sp>
+        <p:nvSpPr>
+          <p:cNvPr id="5" name="TextBox 4"/>
+          <p:cNvSpPr txBox="1"/>
+          <p:nvPr/>
+        </p:nvSpPr>
+        <p:spPr>
+          <a:xfrm>
+            <a:off x="246888" y="2176272"/>
+            <a:ext cx="1472184" cy="2308324"/>
+          </a:xfrm>
+          <a:prstGeom prst="rect">
+            <a:avLst/>
+          </a:prstGeom>
+          <a:noFill/>
+        </p:spPr>
+        <p:txBody>
+          <a:bodyPr wrap="square" rtlCol="0">
+            <a:spAutoFit/>
+          </a:bodyPr>
+          <a:lstStyle/>
+          <a:p>
+            <a:r>
+              <a:rPr lang="en-US" dirty="0" smtClean="0"/>
+              <a:t>but we actually have to put here the modulo size to be – let say to 3 delta instead of 1</a:t>
+            </a:r>
+            <a:endParaRPr lang="en-US" dirty="0"/>
+          </a:p>
+        </p:txBody>
+      </p:sp>
+    </p:spTree>
+    <p:extLst>
+      <p:ext uri="{BB962C8B-B14F-4D97-AF65-F5344CB8AC3E}">
+        <p14:creationId xmlns:p14="http://schemas.microsoft.com/office/powerpoint/2010/main" val="3570919289"/>
+      </p:ext>
+    </p:extLst>
+  </p:cSld>
+  <p:clrMapOvr>
+    <a:masterClrMapping/>
+  </p:clrMapOvr>
+</p:sld>
+</file>
+
+<file path=ppt/slides/slide7.xml><?xml version="1.0" encoding="utf-8"?>
+<p:sld xmlns:a="http://schemas.openxmlformats.org/drawingml/2006/main" xmlns:r="http://schemas.openxmlformats.org/officeDocument/2006/relationships" xmlns:p="http://schemas.openxmlformats.org/presentationml/2006/main">
+  <p:cSld>
+    <p:spTree>
+      <p:nvGrpSpPr>
+        <p:cNvPr id="1" name=""/>
+        <p:cNvGrpSpPr/>
+        <p:nvPr/>
+      </p:nvGrpSpPr>
+      <p:grpSpPr>
+        <a:xfrm>
+          <a:off x="0" y="0"/>
+          <a:ext cx="0" cy="0"/>
+          <a:chOff x="0" y="0"/>
+          <a:chExt cx="0" cy="0"/>
+        </a:xfrm>
+      </p:grpSpPr>
+      <p:sp>
+        <p:nvSpPr>
+          <p:cNvPr id="2" name="Title 1"/>
+          <p:cNvSpPr>
+            <a:spLocks noGrp="1"/>
+          </p:cNvSpPr>
+          <p:nvPr>
+            <p:ph type="title"/>
+          </p:nvPr>
+        </p:nvSpPr>
+        <p:spPr/>
+        <p:txBody>
+          <a:bodyPr/>
+          <a:lstStyle/>
+          <a:p>
+            <a:r>
+              <a:rPr lang="en-US" dirty="0" smtClean="0"/>
               <a:t>but we actually get more variance after A</a:t>
             </a:r>
             <a:endParaRPr lang="en-US" dirty="0"/>
@@ -3592,7 +3752,7 @@
 </p:sld>
 </file>
 
-<file path=ppt/slides/slide7.xml><?xml version="1.0" encoding="utf-8"?>
+<file path=ppt/slides/slide8.xml><?xml version="1.0" encoding="utf-8"?>
 <p:sld xmlns:a="http://schemas.openxmlformats.org/drawingml/2006/main" xmlns:r="http://schemas.openxmlformats.org/officeDocument/2006/relationships" xmlns:p="http://schemas.openxmlformats.org/presentationml/2006/main">
   <p:cSld>
     <p:spTree>
@@ -3813,7 +3973,7 @@
 </p:sld>
 </file>
 
-<file path=ppt/slides/slide8.xml><?xml version="1.0" encoding="utf-8"?>
+<file path=ppt/slides/slide9.xml><?xml version="1.0" encoding="utf-8"?>
 <p:sld xmlns:a="http://schemas.openxmlformats.org/drawingml/2006/main" xmlns:r="http://schemas.openxmlformats.org/officeDocument/2006/relationships" xmlns:p="http://schemas.openxmlformats.org/presentationml/2006/main">
   <p:cSld>
     <p:spTree>

</xml_diff>